<commit_message>
update December 12, 2018 after sending extended work timeline
</commit_message>
<xml_diff>
--- a/extended version/Rectifying_flow_graph.pptx
+++ b/extended version/Rectifying_flow_graph.pptx
@@ -243,7 +243,7 @@
           <a:p>
             <a:fld id="{185F0BFD-5608-4F22-A047-776EBFDB86C9}" type="datetimeFigureOut">
               <a:rPr lang="en-AU" smtClean="0"/>
-              <a:t>20/09/2018</a:t>
+              <a:t>13/11/2018</a:t>
             </a:fld>
             <a:endParaRPr lang="en-AU"/>
           </a:p>
@@ -413,7 +413,7 @@
           <a:p>
             <a:fld id="{185F0BFD-5608-4F22-A047-776EBFDB86C9}" type="datetimeFigureOut">
               <a:rPr lang="en-AU" smtClean="0"/>
-              <a:t>20/09/2018</a:t>
+              <a:t>13/11/2018</a:t>
             </a:fld>
             <a:endParaRPr lang="en-AU"/>
           </a:p>
@@ -593,7 +593,7 @@
           <a:p>
             <a:fld id="{185F0BFD-5608-4F22-A047-776EBFDB86C9}" type="datetimeFigureOut">
               <a:rPr lang="en-AU" smtClean="0"/>
-              <a:t>20/09/2018</a:t>
+              <a:t>13/11/2018</a:t>
             </a:fld>
             <a:endParaRPr lang="en-AU"/>
           </a:p>
@@ -763,7 +763,7 @@
           <a:p>
             <a:fld id="{185F0BFD-5608-4F22-A047-776EBFDB86C9}" type="datetimeFigureOut">
               <a:rPr lang="en-AU" smtClean="0"/>
-              <a:t>20/09/2018</a:t>
+              <a:t>13/11/2018</a:t>
             </a:fld>
             <a:endParaRPr lang="en-AU"/>
           </a:p>
@@ -1009,7 +1009,7 @@
           <a:p>
             <a:fld id="{185F0BFD-5608-4F22-A047-776EBFDB86C9}" type="datetimeFigureOut">
               <a:rPr lang="en-AU" smtClean="0"/>
-              <a:t>20/09/2018</a:t>
+              <a:t>13/11/2018</a:t>
             </a:fld>
             <a:endParaRPr lang="en-AU"/>
           </a:p>
@@ -1241,7 +1241,7 @@
           <a:p>
             <a:fld id="{185F0BFD-5608-4F22-A047-776EBFDB86C9}" type="datetimeFigureOut">
               <a:rPr lang="en-AU" smtClean="0"/>
-              <a:t>20/09/2018</a:t>
+              <a:t>13/11/2018</a:t>
             </a:fld>
             <a:endParaRPr lang="en-AU"/>
           </a:p>
@@ -1608,7 +1608,7 @@
           <a:p>
             <a:fld id="{185F0BFD-5608-4F22-A047-776EBFDB86C9}" type="datetimeFigureOut">
               <a:rPr lang="en-AU" smtClean="0"/>
-              <a:t>20/09/2018</a:t>
+              <a:t>13/11/2018</a:t>
             </a:fld>
             <a:endParaRPr lang="en-AU"/>
           </a:p>
@@ -1726,7 +1726,7 @@
           <a:p>
             <a:fld id="{185F0BFD-5608-4F22-A047-776EBFDB86C9}" type="datetimeFigureOut">
               <a:rPr lang="en-AU" smtClean="0"/>
-              <a:t>20/09/2018</a:t>
+              <a:t>13/11/2018</a:t>
             </a:fld>
             <a:endParaRPr lang="en-AU"/>
           </a:p>
@@ -1821,7 +1821,7 @@
           <a:p>
             <a:fld id="{185F0BFD-5608-4F22-A047-776EBFDB86C9}" type="datetimeFigureOut">
               <a:rPr lang="en-AU" smtClean="0"/>
-              <a:t>20/09/2018</a:t>
+              <a:t>13/11/2018</a:t>
             </a:fld>
             <a:endParaRPr lang="en-AU"/>
           </a:p>
@@ -2098,7 +2098,7 @@
           <a:p>
             <a:fld id="{185F0BFD-5608-4F22-A047-776EBFDB86C9}" type="datetimeFigureOut">
               <a:rPr lang="en-AU" smtClean="0"/>
-              <a:t>20/09/2018</a:t>
+              <a:t>13/11/2018</a:t>
             </a:fld>
             <a:endParaRPr lang="en-AU"/>
           </a:p>
@@ -2351,7 +2351,7 @@
           <a:p>
             <a:fld id="{185F0BFD-5608-4F22-A047-776EBFDB86C9}" type="datetimeFigureOut">
               <a:rPr lang="en-AU" smtClean="0"/>
-              <a:t>20/09/2018</a:t>
+              <a:t>13/11/2018</a:t>
             </a:fld>
             <a:endParaRPr lang="en-AU"/>
           </a:p>
@@ -2564,7 +2564,7 @@
           <a:p>
             <a:fld id="{185F0BFD-5608-4F22-A047-776EBFDB86C9}" type="datetimeFigureOut">
               <a:rPr lang="en-AU" smtClean="0"/>
-              <a:t>20/09/2018</a:t>
+              <a:t>13/11/2018</a:t>
             </a:fld>
             <a:endParaRPr lang="en-AU"/>
           </a:p>
@@ -2977,7 +2977,7 @@
         </p:nvCxnSpPr>
         <p:spPr>
           <a:xfrm>
-            <a:off x="847205" y="606829"/>
+            <a:off x="1986042" y="606829"/>
             <a:ext cx="24939" cy="5228706"/>
           </a:xfrm>
           <a:prstGeom prst="line">
@@ -3012,7 +3012,7 @@
         </p:nvCxnSpPr>
         <p:spPr>
           <a:xfrm flipH="1">
-            <a:off x="859674" y="5833112"/>
+            <a:off x="1998511" y="5833112"/>
             <a:ext cx="6799942" cy="5194"/>
           </a:xfrm>
           <a:prstGeom prst="line">
@@ -3047,7 +3047,7 @@
         </p:nvCxnSpPr>
         <p:spPr>
           <a:xfrm flipV="1">
-            <a:off x="780704" y="688181"/>
+            <a:off x="1919541" y="688181"/>
             <a:ext cx="132744" cy="1772"/>
           </a:xfrm>
           <a:prstGeom prst="line">
@@ -3082,7 +3082,7 @@
         </p:nvCxnSpPr>
         <p:spPr>
           <a:xfrm flipV="1">
-            <a:off x="780704" y="1517288"/>
+            <a:off x="1919541" y="1517288"/>
             <a:ext cx="132744" cy="1772"/>
           </a:xfrm>
           <a:prstGeom prst="line">
@@ -3117,7 +3117,7 @@
         </p:nvCxnSpPr>
         <p:spPr>
           <a:xfrm flipV="1">
-            <a:off x="779752" y="2616041"/>
+            <a:off x="1918589" y="2616041"/>
             <a:ext cx="132744" cy="1772"/>
           </a:xfrm>
           <a:prstGeom prst="line">
@@ -3152,7 +3152,7 @@
         </p:nvCxnSpPr>
         <p:spPr>
           <a:xfrm flipV="1">
-            <a:off x="793302" y="4237868"/>
+            <a:off x="1932139" y="4237868"/>
             <a:ext cx="132744" cy="1772"/>
           </a:xfrm>
           <a:prstGeom prst="line">
@@ -3179,8 +3179,8 @@
           </a:fontRef>
         </p:style>
       </p:cxnSp>
-      <mc:AlternateContent xmlns:mc="http://schemas.openxmlformats.org/markup-compatibility/2006" xmlns:a14="http://schemas.microsoft.com/office/drawing/2010/main">
-        <mc:Choice Requires="a14">
+      <mc:AlternateContent xmlns:mc="http://schemas.openxmlformats.org/markup-compatibility/2006">
+        <mc:Choice xmlns:a14="http://schemas.microsoft.com/office/drawing/2010/main" Requires="a14">
           <p:sp>
             <p:nvSpPr>
               <p:cNvPr id="16" name="TextBox 15"/>
@@ -3189,8 +3189,8 @@
             </p:nvSpPr>
             <p:spPr>
               <a:xfrm>
-                <a:off x="238186" y="503515"/>
-                <a:ext cx="517386" cy="401970"/>
+                <a:off x="1245239" y="418876"/>
+                <a:ext cx="583685" cy="538609"/>
               </a:xfrm>
               <a:prstGeom prst="rect">
                 <a:avLst/>
@@ -3210,34 +3210,53 @@
                       <m:jc m:val="centerGroup"/>
                     </m:oMathParaPr>
                     <m:oMath xmlns:m="http://schemas.openxmlformats.org/officeDocument/2006/math">
-                      <m:rad>
-                        <m:radPr>
-                          <m:degHide m:val="on"/>
+                      <m:sSub>
+                        <m:sSubPr>
                           <m:ctrlPr>
-                            <a:rPr lang="en-AU" i="1">
+                            <a:rPr lang="en-AU" sz="2900" i="1" smtClean="0">
+                              <a:solidFill>
+                                <a:srgbClr val="FF0000"/>
+                              </a:solidFill>
                               <a:latin typeface="Cambria Math" panose="02040503050406030204" pitchFamily="18" charset="0"/>
                             </a:rPr>
                           </m:ctrlPr>
-                        </m:radPr>
-                        <m:deg/>
+                        </m:sSubPr>
                         <m:e>
                           <m:r>
-                            <a:rPr lang="en-AU" i="1">
+                            <a:rPr lang="en-AU" sz="2900" b="0" i="1" smtClean="0">
+                              <a:solidFill>
+                                <a:srgbClr val="FF0000"/>
+                              </a:solidFill>
                               <a:latin typeface="Cambria Math" panose="02040503050406030204" pitchFamily="18" charset="0"/>
                             </a:rPr>
-                            <m:t>2</m:t>
+                            <m:t>𝐼</m:t>
                           </m:r>
                         </m:e>
-                      </m:rad>
+                        <m:sub>
+                          <m:r>
+                            <a:rPr lang="en-AU" sz="2900" b="0" i="1" smtClean="0">
+                              <a:solidFill>
+                                <a:srgbClr val="FF0000"/>
+                              </a:solidFill>
+                              <a:latin typeface="Cambria Math" panose="02040503050406030204" pitchFamily="18" charset="0"/>
+                            </a:rPr>
+                            <m:t>𝑢</m:t>
+                          </m:r>
+                        </m:sub>
+                      </m:sSub>
                     </m:oMath>
                   </m:oMathPara>
                 </a14:m>
-                <a:endParaRPr lang="en-AU" dirty="0"/>
+                <a:endParaRPr lang="en-AU" sz="2900" dirty="0">
+                  <a:solidFill>
+                    <a:srgbClr val="FF0000"/>
+                  </a:solidFill>
+                </a:endParaRPr>
               </a:p>
             </p:txBody>
           </p:sp>
         </mc:Choice>
-        <mc:Fallback xmlns="">
+        <mc:Fallback>
           <p:sp>
             <p:nvSpPr>
               <p:cNvPr id="16" name="TextBox 15"/>
@@ -3248,8 +3267,8 @@
             </p:nvSpPr>
             <p:spPr>
               <a:xfrm>
-                <a:off x="238186" y="503515"/>
-                <a:ext cx="517386" cy="401970"/>
+                <a:off x="1245239" y="418876"/>
+                <a:ext cx="583685" cy="538609"/>
               </a:xfrm>
               <a:prstGeom prst="rect">
                 <a:avLst/>
@@ -3284,7 +3303,7 @@
         </p:nvCxnSpPr>
         <p:spPr>
           <a:xfrm flipV="1">
-            <a:off x="793302" y="3640887"/>
+            <a:off x="1932139" y="3640887"/>
             <a:ext cx="132744" cy="1772"/>
           </a:xfrm>
           <a:prstGeom prst="line">
@@ -3319,7 +3338,7 @@
         </p:nvCxnSpPr>
         <p:spPr>
           <a:xfrm>
-            <a:off x="2192612" y="5772072"/>
+            <a:off x="3331449" y="5772072"/>
             <a:ext cx="1948" cy="129695"/>
           </a:xfrm>
           <a:prstGeom prst="line">
@@ -3354,7 +3373,7 @@
         </p:nvCxnSpPr>
         <p:spPr>
           <a:xfrm>
-            <a:off x="3922612" y="5772072"/>
+            <a:off x="5061449" y="5772072"/>
             <a:ext cx="1948" cy="129695"/>
           </a:xfrm>
           <a:prstGeom prst="line">
@@ -3389,7 +3408,7 @@
         </p:nvCxnSpPr>
         <p:spPr>
           <a:xfrm>
-            <a:off x="5796872" y="5772072"/>
+            <a:off x="6935709" y="5772072"/>
             <a:ext cx="1948" cy="129695"/>
           </a:xfrm>
           <a:prstGeom prst="line">
@@ -3424,7 +3443,7 @@
         </p:nvCxnSpPr>
         <p:spPr>
           <a:xfrm>
-            <a:off x="913448" y="688181"/>
+            <a:off x="2052285" y="688181"/>
             <a:ext cx="408276" cy="0"/>
           </a:xfrm>
           <a:prstGeom prst="line">
@@ -3462,7 +3481,7 @@
         </p:nvCxnSpPr>
         <p:spPr>
           <a:xfrm>
-            <a:off x="7659616" y="5772072"/>
+            <a:off x="8798453" y="5772072"/>
             <a:ext cx="1948" cy="129695"/>
           </a:xfrm>
           <a:prstGeom prst="line">
@@ -3497,7 +3516,7 @@
         </p:nvCxnSpPr>
         <p:spPr>
           <a:xfrm>
-            <a:off x="1359218" y="688181"/>
+            <a:off x="2498055" y="688181"/>
             <a:ext cx="5715" cy="3680417"/>
           </a:xfrm>
           <a:prstGeom prst="line">
@@ -3535,7 +3554,7 @@
         </p:nvCxnSpPr>
         <p:spPr>
           <a:xfrm flipH="1">
-            <a:off x="1321724" y="4339162"/>
+            <a:off x="2460561" y="4339162"/>
             <a:ext cx="4486578" cy="2861"/>
           </a:xfrm>
           <a:prstGeom prst="line">
@@ -3573,7 +3592,7 @@
         </p:nvCxnSpPr>
         <p:spPr>
           <a:xfrm flipH="1">
-            <a:off x="5804276" y="3650152"/>
+            <a:off x="6943113" y="3650152"/>
             <a:ext cx="4026" cy="698072"/>
           </a:xfrm>
           <a:prstGeom prst="line">
@@ -3611,7 +3630,7 @@
         </p:nvCxnSpPr>
         <p:spPr>
           <a:xfrm flipH="1">
-            <a:off x="5792846" y="3650152"/>
+            <a:off x="6931683" y="3650152"/>
             <a:ext cx="1750954" cy="0"/>
           </a:xfrm>
           <a:prstGeom prst="line">
@@ -3649,8 +3668,8 @@
         </p:nvSpPr>
         <p:spPr>
           <a:xfrm>
-            <a:off x="2471062" y="5900384"/>
-            <a:ext cx="1159548" cy="369332"/>
+            <a:off x="3609899" y="5900384"/>
+            <a:ext cx="1373902" cy="430887"/>
           </a:xfrm>
           <a:prstGeom prst="rect">
             <a:avLst/>
@@ -3664,10 +3683,10 @@
           <a:lstStyle/>
           <a:p>
             <a:r>
-              <a:rPr lang="en-AU" dirty="0" smtClean="0"/>
+              <a:rPr lang="en-AU" sz="2200" dirty="0" smtClean="0"/>
               <a:t>Iteration 2</a:t>
             </a:r>
-            <a:endParaRPr lang="en-AU" dirty="0"/>
+            <a:endParaRPr lang="en-AU" sz="2200" dirty="0"/>
           </a:p>
         </p:txBody>
       </p:sp>
@@ -3679,8 +3698,8 @@
         </p:nvSpPr>
         <p:spPr>
           <a:xfrm>
-            <a:off x="890752" y="5900384"/>
-            <a:ext cx="1159548" cy="369332"/>
+            <a:off x="2007165" y="5896575"/>
+            <a:ext cx="1373902" cy="430887"/>
           </a:xfrm>
           <a:prstGeom prst="rect">
             <a:avLst/>
@@ -3694,10 +3713,10 @@
           <a:lstStyle/>
           <a:p>
             <a:r>
-              <a:rPr lang="en-AU" dirty="0" smtClean="0"/>
+              <a:rPr lang="en-AU" sz="2200" dirty="0" smtClean="0"/>
               <a:t>Iteration 1</a:t>
             </a:r>
-            <a:endParaRPr lang="en-AU" dirty="0"/>
+            <a:endParaRPr lang="en-AU" sz="2200" dirty="0"/>
           </a:p>
         </p:txBody>
       </p:sp>
@@ -3709,8 +3728,8 @@
         </p:nvSpPr>
         <p:spPr>
           <a:xfrm>
-            <a:off x="4216562" y="5904674"/>
-            <a:ext cx="1159548" cy="369332"/>
+            <a:off x="5355399" y="5904674"/>
+            <a:ext cx="1373902" cy="430887"/>
           </a:xfrm>
           <a:prstGeom prst="rect">
             <a:avLst/>
@@ -3724,10 +3743,10 @@
           <a:lstStyle/>
           <a:p>
             <a:r>
-              <a:rPr lang="en-AU" dirty="0" smtClean="0"/>
+              <a:rPr lang="en-AU" sz="2200" dirty="0" smtClean="0"/>
               <a:t>Iteration 3</a:t>
             </a:r>
-            <a:endParaRPr lang="en-AU" dirty="0"/>
+            <a:endParaRPr lang="en-AU" sz="2200" dirty="0"/>
           </a:p>
         </p:txBody>
       </p:sp>
@@ -3739,8 +3758,8 @@
         </p:nvSpPr>
         <p:spPr>
           <a:xfrm>
-            <a:off x="6129182" y="5927534"/>
-            <a:ext cx="1159548" cy="369332"/>
+            <a:off x="7268019" y="5927534"/>
+            <a:ext cx="1373902" cy="430887"/>
           </a:xfrm>
           <a:prstGeom prst="rect">
             <a:avLst/>
@@ -3754,10 +3773,10 @@
           <a:lstStyle/>
           <a:p>
             <a:r>
-              <a:rPr lang="en-AU" dirty="0" smtClean="0"/>
+              <a:rPr lang="en-AU" sz="2200" dirty="0" smtClean="0"/>
               <a:t>Iteration 4</a:t>
             </a:r>
-            <a:endParaRPr lang="en-AU" dirty="0"/>
+            <a:endParaRPr lang="en-AU" sz="2200" dirty="0"/>
           </a:p>
         </p:txBody>
       </p:sp>
@@ -3771,8 +3790,8 @@
             </p:nvSpPr>
             <p:spPr>
               <a:xfrm>
-                <a:off x="278118" y="4053202"/>
-                <a:ext cx="542136" cy="369332"/>
+                <a:off x="1226522" y="3958755"/>
+                <a:ext cx="755335" cy="538609"/>
               </a:xfrm>
               <a:prstGeom prst="rect">
                 <a:avLst/>
@@ -3793,7 +3812,7 @@
                     </m:oMathParaPr>
                     <m:oMath xmlns:m="http://schemas.openxmlformats.org/officeDocument/2006/math">
                       <m:r>
-                        <a:rPr lang="en-AU" b="0" i="1" smtClean="0">
+                        <a:rPr lang="en-AU" sz="2900" b="0" i="1" smtClean="0">
                           <a:latin typeface="Cambria Math" panose="02040503050406030204" pitchFamily="18" charset="0"/>
                         </a:rPr>
                         <m:t>0.4</m:t>
@@ -3801,7 +3820,7 @@
                     </m:oMath>
                   </m:oMathPara>
                 </a14:m>
-                <a:endParaRPr lang="en-AU" dirty="0"/>
+                <a:endParaRPr lang="en-AU" sz="2900" dirty="0"/>
               </a:p>
             </p:txBody>
           </p:sp>
@@ -3817,8 +3836,8 @@
             </p:nvSpPr>
             <p:spPr>
               <a:xfrm>
-                <a:off x="278118" y="4053202"/>
-                <a:ext cx="542136" cy="369332"/>
+                <a:off x="1226522" y="3958755"/>
+                <a:ext cx="755335" cy="538609"/>
               </a:xfrm>
               <a:prstGeom prst="rect">
                 <a:avLst/>
@@ -3855,8 +3874,8 @@
             </p:nvSpPr>
             <p:spPr>
               <a:xfrm>
-                <a:off x="278118" y="3467294"/>
-                <a:ext cx="542136" cy="369332"/>
+                <a:off x="1211960" y="3440514"/>
+                <a:ext cx="755335" cy="538609"/>
               </a:xfrm>
               <a:prstGeom prst="rect">
                 <a:avLst/>
@@ -3877,7 +3896,7 @@
                     </m:oMathParaPr>
                     <m:oMath xmlns:m="http://schemas.openxmlformats.org/officeDocument/2006/math">
                       <m:r>
-                        <a:rPr lang="en-AU" b="0" i="1" smtClean="0">
+                        <a:rPr lang="en-AU" sz="2900" b="0" i="1" smtClean="0">
                           <a:latin typeface="Cambria Math" panose="02040503050406030204" pitchFamily="18" charset="0"/>
                         </a:rPr>
                         <m:t>0.6</m:t>
@@ -3885,7 +3904,7 @@
                     </m:oMath>
                   </m:oMathPara>
                 </a14:m>
-                <a:endParaRPr lang="en-AU" dirty="0"/>
+                <a:endParaRPr lang="en-AU" sz="2900" dirty="0"/>
               </a:p>
             </p:txBody>
           </p:sp>
@@ -3901,8 +3920,8 @@
             </p:nvSpPr>
             <p:spPr>
               <a:xfrm>
-                <a:off x="278118" y="3467294"/>
-                <a:ext cx="542136" cy="369332"/>
+                <a:off x="1211960" y="3440514"/>
+                <a:ext cx="755335" cy="538609"/>
               </a:xfrm>
               <a:prstGeom prst="rect">
                 <a:avLst/>
@@ -3929,8 +3948,8 @@
           </p:sp>
         </mc:Fallback>
       </mc:AlternateContent>
-      <mc:AlternateContent xmlns:mc="http://schemas.openxmlformats.org/markup-compatibility/2006" xmlns:a14="http://schemas.microsoft.com/office/drawing/2010/main">
-        <mc:Choice Requires="a14">
+      <mc:AlternateContent xmlns:mc="http://schemas.openxmlformats.org/markup-compatibility/2006">
+        <mc:Choice xmlns:a14="http://schemas.microsoft.com/office/drawing/2010/main" Requires="a14">
           <p:sp>
             <p:nvSpPr>
               <p:cNvPr id="59" name="TextBox 58"/>
@@ -3939,8 +3958,8 @@
             </p:nvSpPr>
             <p:spPr>
               <a:xfrm>
-                <a:off x="899095" y="360030"/>
-                <a:ext cx="1241237" cy="307777"/>
+                <a:off x="2276313" y="303199"/>
+                <a:ext cx="1529713" cy="707886"/>
               </a:xfrm>
               <a:prstGeom prst="rect">
                 <a:avLst/>
@@ -3961,19 +3980,28 @@
                     </m:oMathParaPr>
                     <m:oMath xmlns:m="http://schemas.openxmlformats.org/officeDocument/2006/math">
                       <m:r>
-                        <a:rPr lang="en-AU" sz="1400" b="0" i="1" smtClean="0">
+                        <a:rPr lang="en-AU" sz="2000" i="1">
                           <a:latin typeface="Cambria Math" panose="02040503050406030204" pitchFamily="18" charset="0"/>
                         </a:rPr>
-                        <m:t>𝑠𝑡𝑎𝑡𝑖𝑐</m:t>
+                        <m:t>𝑡h𝑒𝑜𝑟𝑒𝑡𝑖𝑐𝑎𝑙</m:t>
                       </m:r>
+                    </m:oMath>
+                  </m:oMathPara>
+                </a14:m>
+                <a:endParaRPr lang="en-AU" sz="2000" b="0" i="1" dirty="0" smtClean="0">
+                  <a:latin typeface="Cambria Math" panose="02040503050406030204" pitchFamily="18" charset="0"/>
+                </a:endParaRPr>
+              </a:p>
+              <a:p>
+                <a:pPr/>
+                <a14:m>
+                  <m:oMathPara xmlns:m="http://schemas.openxmlformats.org/officeDocument/2006/math">
+                    <m:oMathParaPr>
+                      <m:jc m:val="centerGroup"/>
+                    </m:oMathParaPr>
+                    <m:oMath xmlns:m="http://schemas.openxmlformats.org/officeDocument/2006/math">
                       <m:r>
-                        <a:rPr lang="en-AU" sz="1400" b="0" i="1" smtClean="0">
-                          <a:latin typeface="Cambria Math" panose="02040503050406030204" pitchFamily="18" charset="0"/>
-                        </a:rPr>
-                        <m:t> </m:t>
-                      </m:r>
-                      <m:r>
-                        <a:rPr lang="en-AU" sz="1400" b="0" i="1" smtClean="0">
+                        <a:rPr lang="en-AU" sz="2000" b="0" i="1" smtClean="0">
                           <a:latin typeface="Cambria Math" panose="02040503050406030204" pitchFamily="18" charset="0"/>
                         </a:rPr>
                         <m:t>𝑏𝑜𝑢𝑛𝑑</m:t>
@@ -3981,12 +4009,12 @@
                     </m:oMath>
                   </m:oMathPara>
                 </a14:m>
-                <a:endParaRPr lang="en-AU" sz="1400" dirty="0"/>
+                <a:endParaRPr lang="en-AU" sz="2000" dirty="0"/>
               </a:p>
             </p:txBody>
           </p:sp>
         </mc:Choice>
-        <mc:Fallback xmlns="">
+        <mc:Fallback>
           <p:sp>
             <p:nvSpPr>
               <p:cNvPr id="59" name="TextBox 58"/>
@@ -3997,8 +4025,8 @@
             </p:nvSpPr>
             <p:spPr>
               <a:xfrm>
-                <a:off x="899095" y="360030"/>
-                <a:ext cx="1241237" cy="307777"/>
+                <a:off x="2276313" y="303199"/>
+                <a:ext cx="1529713" cy="707886"/>
               </a:xfrm>
               <a:prstGeom prst="rect">
                 <a:avLst/>
@@ -4025,8 +4053,8 @@
           </p:sp>
         </mc:Fallback>
       </mc:AlternateContent>
-      <mc:AlternateContent xmlns:mc="http://schemas.openxmlformats.org/markup-compatibility/2006" xmlns:a14="http://schemas.microsoft.com/office/drawing/2010/main">
-        <mc:Choice Requires="a14">
+      <mc:AlternateContent xmlns:mc="http://schemas.openxmlformats.org/markup-compatibility/2006">
+        <mc:Choice xmlns:a14="http://schemas.microsoft.com/office/drawing/2010/main" Requires="a14">
           <p:sp>
             <p:nvSpPr>
               <p:cNvPr id="60" name="TextBox 59"/>
@@ -4035,8 +4063,8 @@
             </p:nvSpPr>
             <p:spPr>
               <a:xfrm>
-                <a:off x="2716529" y="4326758"/>
-                <a:ext cx="1305614" cy="307777"/>
+                <a:off x="2131384" y="4220414"/>
+                <a:ext cx="674159" cy="502766"/>
               </a:xfrm>
               <a:prstGeom prst="rect">
                 <a:avLst/>
@@ -4056,33 +4084,68 @@
                       <m:jc m:val="centerGroup"/>
                     </m:oMathParaPr>
                     <m:oMath xmlns:m="http://schemas.openxmlformats.org/officeDocument/2006/math">
-                      <m:r>
-                        <a:rPr lang="en-AU" sz="1400" b="0" i="1" smtClean="0">
-                          <a:latin typeface="Cambria Math" panose="02040503050406030204" pitchFamily="18" charset="0"/>
-                        </a:rPr>
-                        <m:t>𝑙𝑜𝑤𝑒𝑠𝑡</m:t>
-                      </m:r>
-                      <m:r>
-                        <a:rPr lang="en-AU" sz="1400" b="0" i="1" smtClean="0">
-                          <a:latin typeface="Cambria Math" panose="02040503050406030204" pitchFamily="18" charset="0"/>
-                        </a:rPr>
-                        <m:t> </m:t>
-                      </m:r>
-                      <m:r>
-                        <a:rPr lang="en-AU" sz="1400" b="0" i="1" smtClean="0">
-                          <a:latin typeface="Cambria Math" panose="02040503050406030204" pitchFamily="18" charset="0"/>
-                        </a:rPr>
-                        <m:t>𝑏𝑜𝑢𝑛𝑑</m:t>
-                      </m:r>
+                      <m:sSub>
+                        <m:sSubPr>
+                          <m:ctrlPr>
+                            <a:rPr lang="en-AU" sz="2400" b="0" i="1" smtClean="0">
+                              <a:solidFill>
+                                <a:srgbClr val="FF0000"/>
+                              </a:solidFill>
+                              <a:latin typeface="Cambria Math" panose="02040503050406030204" pitchFamily="18" charset="0"/>
+                            </a:rPr>
+                          </m:ctrlPr>
+                        </m:sSubPr>
+                        <m:e>
+                          <m:bar>
+                            <m:barPr>
+                              <m:pos m:val="top"/>
+                              <m:ctrlPr>
+                                <a:rPr lang="en-AU" sz="2400" b="0" i="1" smtClean="0">
+                                  <a:solidFill>
+                                    <a:srgbClr val="FF0000"/>
+                                  </a:solidFill>
+                                  <a:latin typeface="Cambria Math" panose="02040503050406030204" pitchFamily="18" charset="0"/>
+                                </a:rPr>
+                              </m:ctrlPr>
+                            </m:barPr>
+                            <m:e>
+                              <m:r>
+                                <a:rPr lang="en-AU" sz="2400" b="0" i="1" smtClean="0">
+                                  <a:solidFill>
+                                    <a:srgbClr val="FF0000"/>
+                                  </a:solidFill>
+                                  <a:latin typeface="Cambria Math" panose="02040503050406030204" pitchFamily="18" charset="0"/>
+                                </a:rPr>
+                                <m:t>𝐼</m:t>
+                              </m:r>
+                            </m:e>
+                          </m:bar>
+                        </m:e>
+                        <m:sub>
+                          <m:r>
+                            <a:rPr lang="en-AU" sz="2400" b="0" i="1" smtClean="0">
+                              <a:solidFill>
+                                <a:srgbClr val="FF0000"/>
+                              </a:solidFill>
+                              <a:latin typeface="Cambria Math" panose="02040503050406030204" pitchFamily="18" charset="0"/>
+                            </a:rPr>
+                            <m:t>𝑎𝑢</m:t>
+                          </m:r>
+                        </m:sub>
+                      </m:sSub>
                     </m:oMath>
                   </m:oMathPara>
                 </a14:m>
-                <a:endParaRPr lang="en-AU" sz="1400" dirty="0"/>
+                <a:endParaRPr lang="en-AU" sz="2400" dirty="0">
+                  <a:solidFill>
+                    <a:srgbClr val="FF0000"/>
+                  </a:solidFill>
+                </a:endParaRPr>
               </a:p>
             </p:txBody>
           </p:sp>
         </mc:Choice>
-        <mc:Fallback xmlns="">
+        <mc:Fallback>
           <p:sp>
             <p:nvSpPr>
               <p:cNvPr id="60" name="TextBox 59"/>
@@ -4093,8 +4156,8 @@
             </p:nvSpPr>
             <p:spPr>
               <a:xfrm>
-                <a:off x="2716529" y="4326758"/>
-                <a:ext cx="1305614" cy="307777"/>
+                <a:off x="2131384" y="4220414"/>
+                <a:ext cx="674159" cy="502766"/>
               </a:xfrm>
               <a:prstGeom prst="rect">
                 <a:avLst/>
@@ -4121,8 +4184,8 @@
           </p:sp>
         </mc:Fallback>
       </mc:AlternateContent>
-      <mc:AlternateContent xmlns:mc="http://schemas.openxmlformats.org/markup-compatibility/2006">
-        <mc:Choice xmlns:a14="http://schemas.microsoft.com/office/drawing/2010/main" Requires="a14">
+      <mc:AlternateContent xmlns:mc="http://schemas.openxmlformats.org/markup-compatibility/2006" xmlns:a14="http://schemas.microsoft.com/office/drawing/2010/main">
+        <mc:Choice Requires="a14">
           <p:sp>
             <p:nvSpPr>
               <p:cNvPr id="61" name="TextBox 60"/>
@@ -4131,8 +4194,8 @@
             </p:nvSpPr>
             <p:spPr>
               <a:xfrm>
-                <a:off x="5683771" y="3333110"/>
-                <a:ext cx="2050369" cy="307777"/>
+                <a:off x="6943113" y="3701378"/>
+                <a:ext cx="1857560" cy="707886"/>
               </a:xfrm>
               <a:prstGeom prst="rect">
                 <a:avLst/>
@@ -4153,56 +4216,83 @@
                     </m:oMathParaPr>
                     <m:oMath xmlns:m="http://schemas.openxmlformats.org/officeDocument/2006/math">
                       <m:r>
-                        <a:rPr lang="en-AU" sz="1400" b="0" i="1" smtClean="0">
+                        <a:rPr lang="en-AU" sz="2000" b="0" i="1" smtClean="0">
                           <a:latin typeface="Cambria Math" panose="02040503050406030204" pitchFamily="18" charset="0"/>
                         </a:rPr>
                         <m:t>h𝑖𝑔h𝑒𝑟</m:t>
                       </m:r>
                       <m:r>
-                        <a:rPr lang="en-AU" sz="1400" b="0" i="1" smtClean="0">
+                        <a:rPr lang="en-AU" sz="2000" b="0" i="1" smtClean="0">
                           <a:latin typeface="Cambria Math" panose="02040503050406030204" pitchFamily="18" charset="0"/>
                         </a:rPr>
                         <m:t> </m:t>
                       </m:r>
                       <m:r>
-                        <a:rPr lang="en-AU" sz="1400" b="0" i="1" smtClean="0">
+                        <a:rPr lang="en-AU" sz="2000" b="0" i="1" smtClean="0">
                           <a:latin typeface="Cambria Math" panose="02040503050406030204" pitchFamily="18" charset="0"/>
                         </a:rPr>
                         <m:t>𝑏𝑜𝑢𝑛𝑑</m:t>
                       </m:r>
                       <m:r>
-                        <a:rPr lang="en-AU" sz="1400" b="0" i="1" smtClean="0">
+                        <a:rPr lang="en-AU" sz="2000" b="0" i="1" smtClean="0">
+                          <a:latin typeface="Cambria Math" panose="02040503050406030204" pitchFamily="18" charset="0"/>
+                        </a:rPr>
+                        <m:t> </m:t>
+                      </m:r>
+                    </m:oMath>
+                  </m:oMathPara>
+                </a14:m>
+                <a:endParaRPr lang="en-AU" sz="2000" b="0" i="1" dirty="0" smtClean="0">
+                  <a:latin typeface="Cambria Math" panose="02040503050406030204" pitchFamily="18" charset="0"/>
+                </a:endParaRPr>
+              </a:p>
+              <a:p>
+                <a:pPr/>
+                <a14:m>
+                  <m:oMathPara xmlns:m="http://schemas.openxmlformats.org/officeDocument/2006/math">
+                    <m:oMathParaPr>
+                      <m:jc m:val="centerGroup"/>
+                    </m:oMathParaPr>
+                    <m:oMath xmlns:m="http://schemas.openxmlformats.org/officeDocument/2006/math">
+                      <m:r>
+                        <a:rPr lang="en-AU" sz="2000" b="0" i="1" smtClean="0">
+                          <a:latin typeface="Cambria Math" panose="02040503050406030204" pitchFamily="18" charset="0"/>
+                        </a:rPr>
+                        <m:t>𝑖𝑠</m:t>
+                      </m:r>
+                      <m:r>
+                        <a:rPr lang="en-AU" sz="2000" b="0" i="1" smtClean="0">
                           <a:latin typeface="Cambria Math" panose="02040503050406030204" pitchFamily="18" charset="0"/>
                         </a:rPr>
                         <m:t> </m:t>
                       </m:r>
                       <m:r>
-                        <a:rPr lang="en-AU" sz="1400" b="0" i="1" smtClean="0">
+                        <a:rPr lang="en-AU" sz="2000" b="0" i="1" smtClean="0">
                           <a:latin typeface="Cambria Math" panose="02040503050406030204" pitchFamily="18" charset="0"/>
                         </a:rPr>
-                        <m:t>𝑖𝑠</m:t>
+                        <m:t>𝑓𝑜𝑢𝑛𝑑</m:t>
                       </m:r>
                       <m:r>
-                        <a:rPr lang="en-AU" sz="1400" b="0" i="1" smtClean="0">
+                        <a:rPr lang="en-AU" sz="2000" b="0" i="1" smtClean="0">
                           <a:latin typeface="Cambria Math" panose="02040503050406030204" pitchFamily="18" charset="0"/>
                         </a:rPr>
                         <m:t> </m:t>
                       </m:r>
                       <m:r>
-                        <a:rPr lang="en-AU" sz="1400" b="0" i="1" smtClean="0">
+                        <a:rPr lang="en-AU" sz="2000" b="0" i="1" smtClean="0">
                           <a:latin typeface="Cambria Math" panose="02040503050406030204" pitchFamily="18" charset="0"/>
                         </a:rPr>
-                        <m:t>𝑓𝑜𝑢𝑛𝑑</m:t>
+                        <m:t>h𝑒𝑟𝑒</m:t>
                       </m:r>
                     </m:oMath>
                   </m:oMathPara>
                 </a14:m>
-                <a:endParaRPr lang="en-AU" sz="1400" dirty="0"/>
+                <a:endParaRPr lang="en-AU" sz="2000" dirty="0"/>
               </a:p>
             </p:txBody>
           </p:sp>
         </mc:Choice>
-        <mc:Fallback>
+        <mc:Fallback xmlns="">
           <p:sp>
             <p:nvSpPr>
               <p:cNvPr id="61" name="TextBox 60"/>
@@ -4213,8 +4303,8 @@
             </p:nvSpPr>
             <p:spPr>
               <a:xfrm>
-                <a:off x="5683771" y="3333110"/>
-                <a:ext cx="2050369" cy="307777"/>
+                <a:off x="6943113" y="3701378"/>
+                <a:ext cx="1857560" cy="707886"/>
               </a:xfrm>
               <a:prstGeom prst="rect">
                 <a:avLst/>
@@ -4222,7 +4312,239 @@
               <a:blipFill>
                 <a:blip r:embed="rId7"/>
                 <a:stretch>
-                  <a:fillRect b="-8000"/>
+                  <a:fillRect b="-7759"/>
+                </a:stretch>
+              </a:blipFill>
+            </p:spPr>
+            <p:txBody>
+              <a:bodyPr/>
+              <a:lstStyle/>
+              <a:p>
+                <a:r>
+                  <a:rPr lang="en-AU">
+                    <a:noFill/>
+                  </a:rPr>
+                  <a:t> </a:t>
+                </a:r>
+              </a:p>
+            </p:txBody>
+          </p:sp>
+        </mc:Fallback>
+      </mc:AlternateContent>
+      <mc:AlternateContent xmlns:mc="http://schemas.openxmlformats.org/markup-compatibility/2006">
+        <mc:Choice xmlns:a14="http://schemas.microsoft.com/office/drawing/2010/main" Requires="a14">
+          <p:sp>
+            <p:nvSpPr>
+              <p:cNvPr id="2" name="Rectangle 1"/>
+              <p:cNvSpPr/>
+              <p:nvPr/>
+            </p:nvSpPr>
+            <p:spPr>
+              <a:xfrm>
+                <a:off x="1944266" y="4632865"/>
+                <a:ext cx="1418593" cy="369332"/>
+              </a:xfrm>
+              <a:prstGeom prst="rect">
+                <a:avLst/>
+              </a:prstGeom>
+            </p:spPr>
+            <p:txBody>
+              <a:bodyPr wrap="none">
+                <a:spAutoFit/>
+              </a:bodyPr>
+              <a:lstStyle/>
+              <a:p>
+                <a14:m>
+                  <m:oMathPara xmlns:m="http://schemas.openxmlformats.org/officeDocument/2006/math">
+                    <m:oMathParaPr>
+                      <m:jc m:val="centerGroup"/>
+                    </m:oMathParaPr>
+                    <m:oMath xmlns:m="http://schemas.openxmlformats.org/officeDocument/2006/math">
+                      <m:r>
+                        <a:rPr lang="en-AU" i="1" smtClean="0">
+                          <a:solidFill>
+                            <a:schemeClr val="tx1"/>
+                          </a:solidFill>
+                          <a:latin typeface="Cambria Math" panose="02040503050406030204" pitchFamily="18" charset="0"/>
+                        </a:rPr>
+                        <m:t>𝑛𝑒𝑤</m:t>
+                      </m:r>
+                      <m:r>
+                        <a:rPr lang="en-AU" i="1" smtClean="0">
+                          <a:solidFill>
+                            <a:schemeClr val="tx1"/>
+                          </a:solidFill>
+                          <a:latin typeface="Cambria Math" panose="02040503050406030204" pitchFamily="18" charset="0"/>
+                        </a:rPr>
+                        <m:t> </m:t>
+                      </m:r>
+                      <m:r>
+                        <a:rPr lang="en-AU" i="1" smtClean="0">
+                          <a:solidFill>
+                            <a:schemeClr val="tx1"/>
+                          </a:solidFill>
+                          <a:latin typeface="Cambria Math" panose="02040503050406030204" pitchFamily="18" charset="0"/>
+                        </a:rPr>
+                        <m:t>𝑏𝑜𝑢𝑛𝑑</m:t>
+                      </m:r>
+                      <m:r>
+                        <a:rPr lang="en-AU" i="1" smtClean="0">
+                          <a:solidFill>
+                            <a:schemeClr val="tx1"/>
+                          </a:solidFill>
+                          <a:latin typeface="Cambria Math" panose="02040503050406030204" pitchFamily="18" charset="0"/>
+                        </a:rPr>
+                        <m:t> </m:t>
+                      </m:r>
+                    </m:oMath>
+                  </m:oMathPara>
+                </a14:m>
+                <a:endParaRPr lang="en-AU" dirty="0">
+                  <a:solidFill>
+                    <a:schemeClr val="tx1"/>
+                  </a:solidFill>
+                </a:endParaRPr>
+              </a:p>
+            </p:txBody>
+          </p:sp>
+        </mc:Choice>
+        <mc:Fallback>
+          <p:sp>
+            <p:nvSpPr>
+              <p:cNvPr id="2" name="Rectangle 1"/>
+              <p:cNvSpPr>
+                <a:spLocks noRot="1" noChangeAspect="1" noMove="1" noResize="1" noEditPoints="1" noAdjustHandles="1" noChangeArrowheads="1" noChangeShapeType="1" noTextEdit="1"/>
+              </p:cNvSpPr>
+              <p:nvPr/>
+            </p:nvSpPr>
+            <p:spPr>
+              <a:xfrm>
+                <a:off x="1944266" y="4632865"/>
+                <a:ext cx="1418593" cy="369332"/>
+              </a:xfrm>
+              <a:prstGeom prst="rect">
+                <a:avLst/>
+              </a:prstGeom>
+              <a:blipFill>
+                <a:blip r:embed="rId8"/>
+                <a:stretch>
+                  <a:fillRect/>
+                </a:stretch>
+              </a:blipFill>
+            </p:spPr>
+            <p:txBody>
+              <a:bodyPr/>
+              <a:lstStyle/>
+              <a:p>
+                <a:r>
+                  <a:rPr lang="en-AU">
+                    <a:noFill/>
+                  </a:rPr>
+                  <a:t> </a:t>
+                </a:r>
+              </a:p>
+            </p:txBody>
+          </p:sp>
+        </mc:Fallback>
+      </mc:AlternateContent>
+      <mc:AlternateContent xmlns:mc="http://schemas.openxmlformats.org/markup-compatibility/2006">
+        <mc:Choice xmlns:a14="http://schemas.microsoft.com/office/drawing/2010/main" Requires="a14">
+          <p:sp>
+            <p:nvSpPr>
+              <p:cNvPr id="29" name="TextBox 28"/>
+              <p:cNvSpPr txBox="1"/>
+              <p:nvPr/>
+            </p:nvSpPr>
+            <p:spPr>
+              <a:xfrm>
+                <a:off x="8611238" y="3410940"/>
+                <a:ext cx="656141" cy="461665"/>
+              </a:xfrm>
+              <a:prstGeom prst="rect">
+                <a:avLst/>
+              </a:prstGeom>
+              <a:noFill/>
+            </p:spPr>
+            <p:txBody>
+              <a:bodyPr wrap="none" rtlCol="0">
+                <a:spAutoFit/>
+              </a:bodyPr>
+              <a:lstStyle/>
+              <a:p>
+                <a:pPr/>
+                <a14:m>
+                  <m:oMathPara xmlns:m="http://schemas.openxmlformats.org/officeDocument/2006/math">
+                    <m:oMathParaPr>
+                      <m:jc m:val="centerGroup"/>
+                    </m:oMathParaPr>
+                    <m:oMath xmlns:m="http://schemas.openxmlformats.org/officeDocument/2006/math">
+                      <m:sSub>
+                        <m:sSubPr>
+                          <m:ctrlPr>
+                            <a:rPr lang="en-AU" sz="2400" b="0" i="1" smtClean="0">
+                              <a:solidFill>
+                                <a:srgbClr val="FF0000"/>
+                              </a:solidFill>
+                              <a:latin typeface="Cambria Math" panose="02040503050406030204" pitchFamily="18" charset="0"/>
+                            </a:rPr>
+                          </m:ctrlPr>
+                        </m:sSubPr>
+                        <m:e>
+                          <m:r>
+                            <a:rPr lang="en-AU" sz="2400" b="0" i="1" smtClean="0">
+                              <a:solidFill>
+                                <a:srgbClr val="FF0000"/>
+                              </a:solidFill>
+                              <a:latin typeface="Cambria Math" panose="02040503050406030204" pitchFamily="18" charset="0"/>
+                            </a:rPr>
+                            <m:t>𝐼</m:t>
+                          </m:r>
+                        </m:e>
+                        <m:sub>
+                          <m:r>
+                            <a:rPr lang="en-AU" sz="2400" b="0" i="1" smtClean="0">
+                              <a:solidFill>
+                                <a:srgbClr val="FF0000"/>
+                              </a:solidFill>
+                              <a:latin typeface="Cambria Math" panose="02040503050406030204" pitchFamily="18" charset="0"/>
+                            </a:rPr>
+                            <m:t>𝑎𝑢</m:t>
+                          </m:r>
+                        </m:sub>
+                      </m:sSub>
+                    </m:oMath>
+                  </m:oMathPara>
+                </a14:m>
+                <a:endParaRPr lang="en-AU" sz="2400" dirty="0">
+                  <a:solidFill>
+                    <a:srgbClr val="FF0000"/>
+                  </a:solidFill>
+                </a:endParaRPr>
+              </a:p>
+            </p:txBody>
+          </p:sp>
+        </mc:Choice>
+        <mc:Fallback>
+          <p:sp>
+            <p:nvSpPr>
+              <p:cNvPr id="29" name="TextBox 28"/>
+              <p:cNvSpPr txBox="1">
+                <a:spLocks noRot="1" noChangeAspect="1" noMove="1" noResize="1" noEditPoints="1" noAdjustHandles="1" noChangeArrowheads="1" noChangeShapeType="1" noTextEdit="1"/>
+              </p:cNvSpPr>
+              <p:nvPr/>
+            </p:nvSpPr>
+            <p:spPr>
+              <a:xfrm>
+                <a:off x="8611238" y="3410940"/>
+                <a:ext cx="656141" cy="461665"/>
+              </a:xfrm>
+              <a:prstGeom prst="rect">
+                <a:avLst/>
+              </a:prstGeom>
+              <a:blipFill>
+                <a:blip r:embed="rId9"/>
+                <a:stretch>
+                  <a:fillRect/>
                 </a:stretch>
               </a:blipFill>
             </p:spPr>

</xml_diff>